<commit_message>
Updated on 9 Feb
</commit_message>
<xml_diff>
--- a/Group Presentation slides.pptx
+++ b/Group Presentation slides.pptx
@@ -270,7 +270,7 @@
           <a:p>
             <a:fld id="{E3B38CAD-F540-42C4-9FB5-A4C751C0EE11}" type="datetimeFigureOut">
               <a:rPr lang="en-US" smtClean="0"/>
-              <a:t>2/1/2025</a:t>
+              <a:t>2/9/2025</a:t>
             </a:fld>
             <a:endParaRPr lang="en-US"/>
           </a:p>
@@ -468,7 +468,7 @@
           <a:p>
             <a:fld id="{E3B38CAD-F540-42C4-9FB5-A4C751C0EE11}" type="datetimeFigureOut">
               <a:rPr lang="en-US" smtClean="0"/>
-              <a:t>2/1/2025</a:t>
+              <a:t>2/9/2025</a:t>
             </a:fld>
             <a:endParaRPr lang="en-US"/>
           </a:p>
@@ -676,7 +676,7 @@
           <a:p>
             <a:fld id="{E3B38CAD-F540-42C4-9FB5-A4C751C0EE11}" type="datetimeFigureOut">
               <a:rPr lang="en-US" smtClean="0"/>
-              <a:t>2/1/2025</a:t>
+              <a:t>2/9/2025</a:t>
             </a:fld>
             <a:endParaRPr lang="en-US"/>
           </a:p>
@@ -874,7 +874,7 @@
           <a:p>
             <a:fld id="{E3B38CAD-F540-42C4-9FB5-A4C751C0EE11}" type="datetimeFigureOut">
               <a:rPr lang="en-US" smtClean="0"/>
-              <a:t>2/1/2025</a:t>
+              <a:t>2/9/2025</a:t>
             </a:fld>
             <a:endParaRPr lang="en-US"/>
           </a:p>
@@ -1149,7 +1149,7 @@
           <a:p>
             <a:fld id="{E3B38CAD-F540-42C4-9FB5-A4C751C0EE11}" type="datetimeFigureOut">
               <a:rPr lang="en-US" smtClean="0"/>
-              <a:t>2/1/2025</a:t>
+              <a:t>2/9/2025</a:t>
             </a:fld>
             <a:endParaRPr lang="en-US"/>
           </a:p>
@@ -1414,7 +1414,7 @@
           <a:p>
             <a:fld id="{E3B38CAD-F540-42C4-9FB5-A4C751C0EE11}" type="datetimeFigureOut">
               <a:rPr lang="en-US" smtClean="0"/>
-              <a:t>2/1/2025</a:t>
+              <a:t>2/9/2025</a:t>
             </a:fld>
             <a:endParaRPr lang="en-US"/>
           </a:p>
@@ -1826,7 +1826,7 @@
           <a:p>
             <a:fld id="{E3B38CAD-F540-42C4-9FB5-A4C751C0EE11}" type="datetimeFigureOut">
               <a:rPr lang="en-US" smtClean="0"/>
-              <a:t>2/1/2025</a:t>
+              <a:t>2/9/2025</a:t>
             </a:fld>
             <a:endParaRPr lang="en-US"/>
           </a:p>
@@ -1967,7 +1967,7 @@
           <a:p>
             <a:fld id="{E3B38CAD-F540-42C4-9FB5-A4C751C0EE11}" type="datetimeFigureOut">
               <a:rPr lang="en-US" smtClean="0"/>
-              <a:t>2/1/2025</a:t>
+              <a:t>2/9/2025</a:t>
             </a:fld>
             <a:endParaRPr lang="en-US"/>
           </a:p>
@@ -2080,7 +2080,7 @@
           <a:p>
             <a:fld id="{E3B38CAD-F540-42C4-9FB5-A4C751C0EE11}" type="datetimeFigureOut">
               <a:rPr lang="en-US" smtClean="0"/>
-              <a:t>2/1/2025</a:t>
+              <a:t>2/9/2025</a:t>
             </a:fld>
             <a:endParaRPr lang="en-US"/>
           </a:p>
@@ -2391,7 +2391,7 @@
           <a:p>
             <a:fld id="{E3B38CAD-F540-42C4-9FB5-A4C751C0EE11}" type="datetimeFigureOut">
               <a:rPr lang="en-US" smtClean="0"/>
-              <a:t>2/1/2025</a:t>
+              <a:t>2/9/2025</a:t>
             </a:fld>
             <a:endParaRPr lang="en-US"/>
           </a:p>
@@ -2679,7 +2679,7 @@
           <a:p>
             <a:fld id="{E3B38CAD-F540-42C4-9FB5-A4C751C0EE11}" type="datetimeFigureOut">
               <a:rPr lang="en-US" smtClean="0"/>
-              <a:t>2/1/2025</a:t>
+              <a:t>2/9/2025</a:t>
             </a:fld>
             <a:endParaRPr lang="en-US"/>
           </a:p>
@@ -2920,7 +2920,7 @@
           <a:p>
             <a:fld id="{E3B38CAD-F540-42C4-9FB5-A4C751C0EE11}" type="datetimeFigureOut">
               <a:rPr lang="en-US" smtClean="0"/>
-              <a:t>2/1/2025</a:t>
+              <a:t>2/9/2025</a:t>
             </a:fld>
             <a:endParaRPr lang="en-US"/>
           </a:p>
@@ -4097,42 +4097,12 @@
           <a:lstStyle/>
           <a:p>
             <a:r>
-              <a:rPr lang="en-US" sz="2000"/>
-              <a:t>Next, point our VM’s browser to 127.0.0.1:8080/container.html.  You should be presented with the page we created previously.</a:t>
-            </a:r>
-          </a:p>
-        </p:txBody>
-      </p:sp>
-      <p:pic>
-        <p:nvPicPr>
-          <p:cNvPr id="3" name="Picture 2" descr="A screenshot of a computer&#10;&#10;Description automatically generated">
-            <a:extLst>
-              <a:ext uri="{FF2B5EF4-FFF2-40B4-BE49-F238E27FC236}">
-                <a16:creationId xmlns:a16="http://schemas.microsoft.com/office/drawing/2014/main" id="{CED060F4-3686-C2B4-78B5-36B3B8840518}"/>
-              </a:ext>
-            </a:extLst>
-          </p:cNvPr>
-          <p:cNvPicPr>
-            <a:picLocks noChangeAspect="1"/>
-          </p:cNvPicPr>
-          <p:nvPr/>
-        </p:nvPicPr>
-        <p:blipFill>
-          <a:blip r:embed="rId2"/>
-          <a:stretch>
-            <a:fillRect/>
-          </a:stretch>
-        </p:blipFill>
-        <p:spPr>
-          <a:xfrm>
-            <a:off x="4987672" y="2051959"/>
-            <a:ext cx="6389346" cy="2763391"/>
-          </a:xfrm>
-          <a:prstGeom prst="rect">
-            <a:avLst/>
-          </a:prstGeom>
-        </p:spPr>
-      </p:pic>
+              <a:rPr lang="en-US" sz="2000" dirty="0"/>
+              <a:t>Next, point our VM’s browser to 192.168.0.106:8080.  You should be presented with the page we created previously.</a:t>
+            </a:r>
+          </a:p>
+        </p:txBody>
+      </p:sp>
       <p:grpSp>
         <p:nvGrpSpPr>
           <p:cNvPr id="10" name="Group 9">
@@ -4310,6 +4280,36 @@
           </p:txBody>
         </p:sp>
       </p:grpSp>
+      <p:pic>
+        <p:nvPicPr>
+          <p:cNvPr id="6" name="Picture 5">
+            <a:extLst>
+              <a:ext uri="{FF2B5EF4-FFF2-40B4-BE49-F238E27FC236}">
+                <a16:creationId xmlns:a16="http://schemas.microsoft.com/office/drawing/2014/main" id="{2F311E48-3B7D-0ACC-E01E-B84A0DD2BEE7}"/>
+              </a:ext>
+            </a:extLst>
+          </p:cNvPr>
+          <p:cNvPicPr>
+            <a:picLocks noChangeAspect="1"/>
+          </p:cNvPicPr>
+          <p:nvPr/>
+        </p:nvPicPr>
+        <p:blipFill>
+          <a:blip r:embed="rId2"/>
+          <a:stretch>
+            <a:fillRect/>
+          </a:stretch>
+        </p:blipFill>
+        <p:spPr>
+          <a:xfrm>
+            <a:off x="4325220" y="741391"/>
+            <a:ext cx="7068536" cy="4087748"/>
+          </a:xfrm>
+          <a:prstGeom prst="rect">
+            <a:avLst/>
+          </a:prstGeom>
+        </p:spPr>
+      </p:pic>
     </p:spTree>
     <p:extLst>
       <p:ext uri="{BB962C8B-B14F-4D97-AF65-F5344CB8AC3E}">
@@ -8047,27 +8047,31 @@
           <a:lstStyle/>
           <a:p>
             <a:r>
-              <a:rPr lang="en-US" sz="2000"/>
-              <a:t>Now we create a simple web page html file named container.html inside the /home/user/website directory using vi editor</a:t>
-            </a:r>
-          </a:p>
-          <a:p>
-            <a:r>
-              <a:rPr lang="en-US" sz="2000"/>
-              <a:t>sudo vi /home/student/website/container.html</a:t>
-            </a:r>
-          </a:p>
-          <a:p>
-            <a:endParaRPr lang="en-US" sz="2000"/>
+              <a:rPr lang="en-US" sz="2000" dirty="0"/>
+              <a:t>Now we create a simple web page html file named index.html inside the /home/user/website directory using vi editor</a:t>
+            </a:r>
+          </a:p>
+          <a:p>
+            <a:r>
+              <a:rPr lang="en-US" sz="2000" dirty="0" err="1"/>
+              <a:t>sudo</a:t>
+            </a:r>
+            <a:r>
+              <a:rPr lang="en-US" sz="2000" dirty="0"/>
+              <a:t> vi /home/student/website/index.html</a:t>
+            </a:r>
+          </a:p>
+          <a:p>
+            <a:endParaRPr lang="en-US" sz="2000" dirty="0"/>
           </a:p>
         </p:txBody>
       </p:sp>
       <p:pic>
         <p:nvPicPr>
-          <p:cNvPr id="6" name="Picture 5" descr="A screen shot of a computer&#10;&#10;Description automatically generated">
-            <a:extLst>
-              <a:ext uri="{FF2B5EF4-FFF2-40B4-BE49-F238E27FC236}">
-                <a16:creationId xmlns:a16="http://schemas.microsoft.com/office/drawing/2014/main" id="{34D3224F-5287-9FC3-3C77-A3823184B61F}"/>
+          <p:cNvPr id="4" name="Picture 3">
+            <a:extLst>
+              <a:ext uri="{FF2B5EF4-FFF2-40B4-BE49-F238E27FC236}">
+                <a16:creationId xmlns:a16="http://schemas.microsoft.com/office/drawing/2014/main" id="{F38722EA-CC17-9630-97B2-3B9F94AE6CFE}"/>
               </a:ext>
             </a:extLst>
           </p:cNvPr>
@@ -8084,8 +8088,8 @@
         </p:blipFill>
         <p:spPr>
           <a:xfrm>
-            <a:off x="6082748" y="1982910"/>
-            <a:ext cx="5334160" cy="2893780"/>
+            <a:off x="5306602" y="1032972"/>
+            <a:ext cx="6815136" cy="3801006"/>
           </a:xfrm>
           <a:prstGeom prst="rect">
             <a:avLst/>

</xml_diff>